<commit_message>
Comparator, String, StringBuilder and Greedy Algorithm
</commit_message>
<xml_diff>
--- a/DSA/Stiver DSA/Greedy Algorithms/Easy.pptx
+++ b/DSA/Stiver DSA/Greedy Algorithms/Easy.pptx
@@ -8,6 +8,17 @@
     <p:sldId id="256" r:id="rId2"/>
     <p:sldId id="263" r:id="rId3"/>
     <p:sldId id="262" r:id="rId4"/>
+    <p:sldId id="267" r:id="rId5"/>
+    <p:sldId id="264" r:id="rId6"/>
+    <p:sldId id="268" r:id="rId7"/>
+    <p:sldId id="266" r:id="rId8"/>
+    <p:sldId id="269" r:id="rId9"/>
+    <p:sldId id="271" r:id="rId10"/>
+    <p:sldId id="270" r:id="rId11"/>
+    <p:sldId id="272" r:id="rId12"/>
+    <p:sldId id="273" r:id="rId13"/>
+    <p:sldId id="274" r:id="rId14"/>
+    <p:sldId id="275" r:id="rId15"/>
   </p:sldIdLst>
   <p:sldSz cx="12192000" cy="6858000"/>
   <p:notesSz cx="6858000" cy="9144000"/>
@@ -120,7 +131,33 @@
             <p14:sldId id="262"/>
           </p14:sldIdLst>
         </p14:section>
+        <p14:section name="GFG : Fractional Knapsack" id="{157DBD40-39F7-4069-A296-C766B222AFBD}">
+          <p14:sldIdLst>
+            <p14:sldId id="267"/>
+            <p14:sldId id="264"/>
+            <p14:sldId id="268"/>
+          </p14:sldIdLst>
+        </p14:section>
+        <p14:section name="GFG : Minimum number of Coins" id="{BE864C39-8B3C-4558-B500-540DE1339824}">
+          <p14:sldIdLst>
+            <p14:sldId id="266"/>
+            <p14:sldId id="269"/>
+          </p14:sldIdLst>
+        </p14:section>
+        <p14:section name="LCE 860 : Lemonade Change" id="{A767C9FD-9D59-4A9D-9EEF-C7F38144BE7D}">
+          <p14:sldIdLst>
+            <p14:sldId id="271"/>
+            <p14:sldId id="270"/>
+            <p14:sldId id="272"/>
+            <p14:sldId id="273"/>
+            <p14:sldId id="274"/>
+            <p14:sldId id="275"/>
+          </p14:sldIdLst>
+        </p14:section>
       </p14:sectionLst>
+    </p:ext>
+    <p:ext uri="{EFAFB233-063F-42B5-8137-9DF3F51BA10A}">
+      <p15:sldGuideLst xmlns:p15="http://schemas.microsoft.com/office/powerpoint/2012/main"/>
     </p:ext>
   </p:extLst>
 </p:presentation>
@@ -275,7 +312,7 @@
           <a:p>
             <a:fld id="{A34715BA-7C62-4420-BB47-C59B7E6BD784}" type="datetimeFigureOut">
               <a:rPr lang="en-IN" smtClean="0"/>
-              <a:t>18-01-2026</a:t>
+              <a:t>24-01-2026</a:t>
             </a:fld>
             <a:endParaRPr lang="en-IN"/>
           </a:p>
@@ -475,7 +512,7 @@
           <a:p>
             <a:fld id="{A34715BA-7C62-4420-BB47-C59B7E6BD784}" type="datetimeFigureOut">
               <a:rPr lang="en-IN" smtClean="0"/>
-              <a:t>18-01-2026</a:t>
+              <a:t>24-01-2026</a:t>
             </a:fld>
             <a:endParaRPr lang="en-IN"/>
           </a:p>
@@ -685,7 +722,7 @@
           <a:p>
             <a:fld id="{A34715BA-7C62-4420-BB47-C59B7E6BD784}" type="datetimeFigureOut">
               <a:rPr lang="en-IN" smtClean="0"/>
-              <a:t>18-01-2026</a:t>
+              <a:t>24-01-2026</a:t>
             </a:fld>
             <a:endParaRPr lang="en-IN"/>
           </a:p>
@@ -885,7 +922,7 @@
           <a:p>
             <a:fld id="{A34715BA-7C62-4420-BB47-C59B7E6BD784}" type="datetimeFigureOut">
               <a:rPr lang="en-IN" smtClean="0"/>
-              <a:t>18-01-2026</a:t>
+              <a:t>24-01-2026</a:t>
             </a:fld>
             <a:endParaRPr lang="en-IN"/>
           </a:p>
@@ -1161,7 +1198,7 @@
           <a:p>
             <a:fld id="{A34715BA-7C62-4420-BB47-C59B7E6BD784}" type="datetimeFigureOut">
               <a:rPr lang="en-IN" smtClean="0"/>
-              <a:t>18-01-2026</a:t>
+              <a:t>24-01-2026</a:t>
             </a:fld>
             <a:endParaRPr lang="en-IN"/>
           </a:p>
@@ -1429,7 +1466,7 @@
           <a:p>
             <a:fld id="{A34715BA-7C62-4420-BB47-C59B7E6BD784}" type="datetimeFigureOut">
               <a:rPr lang="en-IN" smtClean="0"/>
-              <a:t>18-01-2026</a:t>
+              <a:t>24-01-2026</a:t>
             </a:fld>
             <a:endParaRPr lang="en-IN"/>
           </a:p>
@@ -1844,7 +1881,7 @@
           <a:p>
             <a:fld id="{A34715BA-7C62-4420-BB47-C59B7E6BD784}" type="datetimeFigureOut">
               <a:rPr lang="en-IN" smtClean="0"/>
-              <a:t>18-01-2026</a:t>
+              <a:t>24-01-2026</a:t>
             </a:fld>
             <a:endParaRPr lang="en-IN"/>
           </a:p>
@@ -1986,7 +2023,7 @@
           <a:p>
             <a:fld id="{A34715BA-7C62-4420-BB47-C59B7E6BD784}" type="datetimeFigureOut">
               <a:rPr lang="en-IN" smtClean="0"/>
-              <a:t>18-01-2026</a:t>
+              <a:t>24-01-2026</a:t>
             </a:fld>
             <a:endParaRPr lang="en-IN"/>
           </a:p>
@@ -2099,7 +2136,7 @@
           <a:p>
             <a:fld id="{A34715BA-7C62-4420-BB47-C59B7E6BD784}" type="datetimeFigureOut">
               <a:rPr lang="en-IN" smtClean="0"/>
-              <a:t>18-01-2026</a:t>
+              <a:t>24-01-2026</a:t>
             </a:fld>
             <a:endParaRPr lang="en-IN"/>
           </a:p>
@@ -2412,7 +2449,7 @@
           <a:p>
             <a:fld id="{A34715BA-7C62-4420-BB47-C59B7E6BD784}" type="datetimeFigureOut">
               <a:rPr lang="en-IN" smtClean="0"/>
-              <a:t>18-01-2026</a:t>
+              <a:t>24-01-2026</a:t>
             </a:fld>
             <a:endParaRPr lang="en-IN"/>
           </a:p>
@@ -2701,7 +2738,7 @@
           <a:p>
             <a:fld id="{A34715BA-7C62-4420-BB47-C59B7E6BD784}" type="datetimeFigureOut">
               <a:rPr lang="en-IN" smtClean="0"/>
-              <a:t>18-01-2026</a:t>
+              <a:t>24-01-2026</a:t>
             </a:fld>
             <a:endParaRPr lang="en-IN"/>
           </a:p>
@@ -2944,7 +2981,7 @@
           <a:p>
             <a:fld id="{A34715BA-7C62-4420-BB47-C59B7E6BD784}" type="datetimeFigureOut">
               <a:rPr lang="en-IN" smtClean="0"/>
-              <a:t>18-01-2026</a:t>
+              <a:t>24-01-2026</a:t>
             </a:fld>
             <a:endParaRPr lang="en-IN"/>
           </a:p>
@@ -3406,6 +3443,186 @@
 </p:sld>
 </file>
 
+<file path=ppt/slides/slide10.xml><?xml version="1.0" encoding="utf-8"?>
+<p:sld xmlns:a="http://schemas.openxmlformats.org/drawingml/2006/main" xmlns:r="http://schemas.openxmlformats.org/officeDocument/2006/relationships" xmlns:p="http://schemas.openxmlformats.org/presentationml/2006/main">
+  <p:cSld>
+    <p:spTree>
+      <p:nvGrpSpPr>
+        <p:cNvPr id="1" name=""/>
+        <p:cNvGrpSpPr/>
+        <p:nvPr/>
+      </p:nvGrpSpPr>
+      <p:grpSpPr>
+        <a:xfrm>
+          <a:off x="0" y="0"/>
+          <a:ext cx="0" cy="0"/>
+          <a:chOff x="0" y="0"/>
+          <a:chExt cx="0" cy="0"/>
+        </a:xfrm>
+      </p:grpSpPr>
+      <p:pic>
+        <p:nvPicPr>
+          <p:cNvPr id="3" name="Picture 2">
+            <a:extLst>
+              <a:ext uri="{FF2B5EF4-FFF2-40B4-BE49-F238E27FC236}">
+                <a16:creationId xmlns:a16="http://schemas.microsoft.com/office/drawing/2014/main" id="{C8E5F72F-8FD0-4B92-8539-2FC9A39C5A6D}"/>
+              </a:ext>
+            </a:extLst>
+          </p:cNvPr>
+          <p:cNvPicPr>
+            <a:picLocks noChangeAspect="1"/>
+          </p:cNvPicPr>
+          <p:nvPr/>
+        </p:nvPicPr>
+        <p:blipFill>
+          <a:blip r:embed="rId2"/>
+          <a:stretch>
+            <a:fillRect/>
+          </a:stretch>
+        </p:blipFill>
+        <p:spPr>
+          <a:xfrm>
+            <a:off x="0" y="0"/>
+            <a:ext cx="12192000" cy="6858000"/>
+          </a:xfrm>
+          <a:prstGeom prst="rect">
+            <a:avLst/>
+          </a:prstGeom>
+        </p:spPr>
+      </p:pic>
+    </p:spTree>
+    <p:extLst>
+      <p:ext uri="{BB962C8B-B14F-4D97-AF65-F5344CB8AC3E}">
+        <p14:creationId xmlns:p14="http://schemas.microsoft.com/office/powerpoint/2010/main" val="873692255"/>
+      </p:ext>
+    </p:extLst>
+  </p:cSld>
+  <p:clrMapOvr>
+    <a:masterClrMapping/>
+  </p:clrMapOvr>
+</p:sld>
+</file>
+
+<file path=ppt/slides/slide11.xml><?xml version="1.0" encoding="utf-8"?>
+<p:sld xmlns:a="http://schemas.openxmlformats.org/drawingml/2006/main" xmlns:r="http://schemas.openxmlformats.org/officeDocument/2006/relationships" xmlns:p="http://schemas.openxmlformats.org/presentationml/2006/main">
+  <p:cSld>
+    <p:spTree>
+      <p:nvGrpSpPr>
+        <p:cNvPr id="1" name=""/>
+        <p:cNvGrpSpPr/>
+        <p:nvPr/>
+      </p:nvGrpSpPr>
+      <p:grpSpPr>
+        <a:xfrm>
+          <a:off x="0" y="0"/>
+          <a:ext cx="0" cy="0"/>
+          <a:chOff x="0" y="0"/>
+          <a:chExt cx="0" cy="0"/>
+        </a:xfrm>
+      </p:grpSpPr>
+    </p:spTree>
+    <p:extLst>
+      <p:ext uri="{BB962C8B-B14F-4D97-AF65-F5344CB8AC3E}">
+        <p14:creationId xmlns:p14="http://schemas.microsoft.com/office/powerpoint/2010/main" val="2995637350"/>
+      </p:ext>
+    </p:extLst>
+  </p:cSld>
+  <p:clrMapOvr>
+    <a:masterClrMapping/>
+  </p:clrMapOvr>
+</p:sld>
+</file>
+
+<file path=ppt/slides/slide12.xml><?xml version="1.0" encoding="utf-8"?>
+<p:sld xmlns:a="http://schemas.openxmlformats.org/drawingml/2006/main" xmlns:r="http://schemas.openxmlformats.org/officeDocument/2006/relationships" xmlns:p="http://schemas.openxmlformats.org/presentationml/2006/main">
+  <p:cSld>
+    <p:spTree>
+      <p:nvGrpSpPr>
+        <p:cNvPr id="1" name=""/>
+        <p:cNvGrpSpPr/>
+        <p:nvPr/>
+      </p:nvGrpSpPr>
+      <p:grpSpPr>
+        <a:xfrm>
+          <a:off x="0" y="0"/>
+          <a:ext cx="0" cy="0"/>
+          <a:chOff x="0" y="0"/>
+          <a:chExt cx="0" cy="0"/>
+        </a:xfrm>
+      </p:grpSpPr>
+    </p:spTree>
+    <p:extLst>
+      <p:ext uri="{BB962C8B-B14F-4D97-AF65-F5344CB8AC3E}">
+        <p14:creationId xmlns:p14="http://schemas.microsoft.com/office/powerpoint/2010/main" val="1169831409"/>
+      </p:ext>
+    </p:extLst>
+  </p:cSld>
+  <p:clrMapOvr>
+    <a:masterClrMapping/>
+  </p:clrMapOvr>
+</p:sld>
+</file>
+
+<file path=ppt/slides/slide13.xml><?xml version="1.0" encoding="utf-8"?>
+<p:sld xmlns:a="http://schemas.openxmlformats.org/drawingml/2006/main" xmlns:r="http://schemas.openxmlformats.org/officeDocument/2006/relationships" xmlns:p="http://schemas.openxmlformats.org/presentationml/2006/main">
+  <p:cSld>
+    <p:spTree>
+      <p:nvGrpSpPr>
+        <p:cNvPr id="1" name=""/>
+        <p:cNvGrpSpPr/>
+        <p:nvPr/>
+      </p:nvGrpSpPr>
+      <p:grpSpPr>
+        <a:xfrm>
+          <a:off x="0" y="0"/>
+          <a:ext cx="0" cy="0"/>
+          <a:chOff x="0" y="0"/>
+          <a:chExt cx="0" cy="0"/>
+        </a:xfrm>
+      </p:grpSpPr>
+    </p:spTree>
+    <p:extLst>
+      <p:ext uri="{BB962C8B-B14F-4D97-AF65-F5344CB8AC3E}">
+        <p14:creationId xmlns:p14="http://schemas.microsoft.com/office/powerpoint/2010/main" val="571519633"/>
+      </p:ext>
+    </p:extLst>
+  </p:cSld>
+  <p:clrMapOvr>
+    <a:masterClrMapping/>
+  </p:clrMapOvr>
+</p:sld>
+</file>
+
+<file path=ppt/slides/slide14.xml><?xml version="1.0" encoding="utf-8"?>
+<p:sld xmlns:a="http://schemas.openxmlformats.org/drawingml/2006/main" xmlns:r="http://schemas.openxmlformats.org/officeDocument/2006/relationships" xmlns:p="http://schemas.openxmlformats.org/presentationml/2006/main">
+  <p:cSld>
+    <p:spTree>
+      <p:nvGrpSpPr>
+        <p:cNvPr id="1" name=""/>
+        <p:cNvGrpSpPr/>
+        <p:nvPr/>
+      </p:nvGrpSpPr>
+      <p:grpSpPr>
+        <a:xfrm>
+          <a:off x="0" y="0"/>
+          <a:ext cx="0" cy="0"/>
+          <a:chOff x="0" y="0"/>
+          <a:chExt cx="0" cy="0"/>
+        </a:xfrm>
+      </p:grpSpPr>
+    </p:spTree>
+    <p:extLst>
+      <p:ext uri="{BB962C8B-B14F-4D97-AF65-F5344CB8AC3E}">
+        <p14:creationId xmlns:p14="http://schemas.microsoft.com/office/powerpoint/2010/main" val="1591421424"/>
+      </p:ext>
+    </p:extLst>
+  </p:cSld>
+  <p:clrMapOvr>
+    <a:masterClrMapping/>
+  </p:clrMapOvr>
+</p:sld>
+</file>
+
 <file path=ppt/slides/slide2.xml><?xml version="1.0" encoding="utf-8"?>
 <p:sld xmlns:a="http://schemas.openxmlformats.org/drawingml/2006/main" xmlns:r="http://schemas.openxmlformats.org/officeDocument/2006/relationships" xmlns:p="http://schemas.openxmlformats.org/presentationml/2006/main">
   <p:cSld>
@@ -3517,6 +3734,396 @@
     <p:extLst>
       <p:ext uri="{BB962C8B-B14F-4D97-AF65-F5344CB8AC3E}">
         <p14:creationId xmlns:p14="http://schemas.microsoft.com/office/powerpoint/2010/main" val="2964768536"/>
+      </p:ext>
+    </p:extLst>
+  </p:cSld>
+  <p:clrMapOvr>
+    <a:masterClrMapping/>
+  </p:clrMapOvr>
+</p:sld>
+</file>
+
+<file path=ppt/slides/slide4.xml><?xml version="1.0" encoding="utf-8"?>
+<p:sld xmlns:a="http://schemas.openxmlformats.org/drawingml/2006/main" xmlns:r="http://schemas.openxmlformats.org/officeDocument/2006/relationships" xmlns:p="http://schemas.openxmlformats.org/presentationml/2006/main">
+  <p:cSld>
+    <p:spTree>
+      <p:nvGrpSpPr>
+        <p:cNvPr id="1" name=""/>
+        <p:cNvGrpSpPr/>
+        <p:nvPr/>
+      </p:nvGrpSpPr>
+      <p:grpSpPr>
+        <a:xfrm>
+          <a:off x="0" y="0"/>
+          <a:ext cx="0" cy="0"/>
+          <a:chOff x="0" y="0"/>
+          <a:chExt cx="0" cy="0"/>
+        </a:xfrm>
+      </p:grpSpPr>
+      <p:pic>
+        <p:nvPicPr>
+          <p:cNvPr id="3" name="Picture 2">
+            <a:extLst>
+              <a:ext uri="{FF2B5EF4-FFF2-40B4-BE49-F238E27FC236}">
+                <a16:creationId xmlns:a16="http://schemas.microsoft.com/office/drawing/2014/main" id="{DBAA61FE-210B-47AC-B7C2-9700469F4A19}"/>
+              </a:ext>
+            </a:extLst>
+          </p:cNvPr>
+          <p:cNvPicPr>
+            <a:picLocks noChangeAspect="1"/>
+          </p:cNvPicPr>
+          <p:nvPr/>
+        </p:nvPicPr>
+        <p:blipFill>
+          <a:blip r:embed="rId2"/>
+          <a:stretch>
+            <a:fillRect/>
+          </a:stretch>
+        </p:blipFill>
+        <p:spPr>
+          <a:xfrm>
+            <a:off x="0" y="0"/>
+            <a:ext cx="12192000" cy="6858000"/>
+          </a:xfrm>
+          <a:prstGeom prst="rect">
+            <a:avLst/>
+          </a:prstGeom>
+        </p:spPr>
+      </p:pic>
+    </p:spTree>
+    <p:extLst>
+      <p:ext uri="{BB962C8B-B14F-4D97-AF65-F5344CB8AC3E}">
+        <p14:creationId xmlns:p14="http://schemas.microsoft.com/office/powerpoint/2010/main" val="1926274989"/>
+      </p:ext>
+    </p:extLst>
+  </p:cSld>
+  <p:clrMapOvr>
+    <a:masterClrMapping/>
+  </p:clrMapOvr>
+</p:sld>
+</file>
+
+<file path=ppt/slides/slide5.xml><?xml version="1.0" encoding="utf-8"?>
+<p:sld xmlns:a="http://schemas.openxmlformats.org/drawingml/2006/main" xmlns:r="http://schemas.openxmlformats.org/officeDocument/2006/relationships" xmlns:p="http://schemas.openxmlformats.org/presentationml/2006/main">
+  <p:cSld>
+    <p:spTree>
+      <p:nvGrpSpPr>
+        <p:cNvPr id="1" name=""/>
+        <p:cNvGrpSpPr/>
+        <p:nvPr/>
+      </p:nvGrpSpPr>
+      <p:grpSpPr>
+        <a:xfrm>
+          <a:off x="0" y="0"/>
+          <a:ext cx="0" cy="0"/>
+          <a:chOff x="0" y="0"/>
+          <a:chExt cx="0" cy="0"/>
+        </a:xfrm>
+      </p:grpSpPr>
+      <p:pic>
+        <p:nvPicPr>
+          <p:cNvPr id="3" name="Picture 2">
+            <a:extLst>
+              <a:ext uri="{FF2B5EF4-FFF2-40B4-BE49-F238E27FC236}">
+                <a16:creationId xmlns:a16="http://schemas.microsoft.com/office/drawing/2014/main" id="{7C1DB85F-ABF0-4FD8-B0E6-E1B732123CB1}"/>
+              </a:ext>
+            </a:extLst>
+          </p:cNvPr>
+          <p:cNvPicPr>
+            <a:picLocks noChangeAspect="1"/>
+          </p:cNvPicPr>
+          <p:nvPr/>
+        </p:nvPicPr>
+        <p:blipFill>
+          <a:blip r:embed="rId2"/>
+          <a:stretch>
+            <a:fillRect/>
+          </a:stretch>
+        </p:blipFill>
+        <p:spPr>
+          <a:xfrm>
+            <a:off x="2744167" y="90999"/>
+            <a:ext cx="6703666" cy="6676003"/>
+          </a:xfrm>
+          <a:prstGeom prst="rect">
+            <a:avLst/>
+          </a:prstGeom>
+        </p:spPr>
+      </p:pic>
+    </p:spTree>
+    <p:extLst>
+      <p:ext uri="{BB962C8B-B14F-4D97-AF65-F5344CB8AC3E}">
+        <p14:creationId xmlns:p14="http://schemas.microsoft.com/office/powerpoint/2010/main" val="1347243129"/>
+      </p:ext>
+    </p:extLst>
+  </p:cSld>
+  <p:clrMapOvr>
+    <a:masterClrMapping/>
+  </p:clrMapOvr>
+</p:sld>
+</file>
+
+<file path=ppt/slides/slide6.xml><?xml version="1.0" encoding="utf-8"?>
+<p:sld xmlns:a="http://schemas.openxmlformats.org/drawingml/2006/main" xmlns:r="http://schemas.openxmlformats.org/officeDocument/2006/relationships" xmlns:p="http://schemas.openxmlformats.org/presentationml/2006/main">
+  <p:cSld>
+    <p:spTree>
+      <p:nvGrpSpPr>
+        <p:cNvPr id="1" name=""/>
+        <p:cNvGrpSpPr/>
+        <p:nvPr/>
+      </p:nvGrpSpPr>
+      <p:grpSpPr>
+        <a:xfrm>
+          <a:off x="0" y="0"/>
+          <a:ext cx="0" cy="0"/>
+          <a:chOff x="0" y="0"/>
+          <a:chExt cx="0" cy="0"/>
+        </a:xfrm>
+      </p:grpSpPr>
+      <p:pic>
+        <p:nvPicPr>
+          <p:cNvPr id="3" name="Picture 2">
+            <a:extLst>
+              <a:ext uri="{FF2B5EF4-FFF2-40B4-BE49-F238E27FC236}">
+                <a16:creationId xmlns:a16="http://schemas.microsoft.com/office/drawing/2014/main" id="{FEB5EBCA-A459-4BF2-9D98-E16AF79FF508}"/>
+              </a:ext>
+            </a:extLst>
+          </p:cNvPr>
+          <p:cNvPicPr>
+            <a:picLocks noChangeAspect="1"/>
+          </p:cNvPicPr>
+          <p:nvPr/>
+        </p:nvPicPr>
+        <p:blipFill>
+          <a:blip r:embed="rId2"/>
+          <a:stretch>
+            <a:fillRect/>
+          </a:stretch>
+        </p:blipFill>
+        <p:spPr>
+          <a:xfrm>
+            <a:off x="524764" y="109440"/>
+            <a:ext cx="5222438" cy="6639119"/>
+          </a:xfrm>
+          <a:prstGeom prst="rect">
+            <a:avLst/>
+          </a:prstGeom>
+        </p:spPr>
+      </p:pic>
+      <p:pic>
+        <p:nvPicPr>
+          <p:cNvPr id="5" name="Picture 4">
+            <a:extLst>
+              <a:ext uri="{FF2B5EF4-FFF2-40B4-BE49-F238E27FC236}">
+                <a16:creationId xmlns:a16="http://schemas.microsoft.com/office/drawing/2014/main" id="{22FB2DE5-74A2-475E-B651-9611744ADD64}"/>
+              </a:ext>
+            </a:extLst>
+          </p:cNvPr>
+          <p:cNvPicPr>
+            <a:picLocks noChangeAspect="1"/>
+          </p:cNvPicPr>
+          <p:nvPr/>
+        </p:nvPicPr>
+        <p:blipFill>
+          <a:blip r:embed="rId3"/>
+          <a:stretch>
+            <a:fillRect/>
+          </a:stretch>
+        </p:blipFill>
+        <p:spPr>
+          <a:xfrm>
+            <a:off x="6176092" y="2005270"/>
+            <a:ext cx="5740994" cy="2677777"/>
+          </a:xfrm>
+          <a:prstGeom prst="rect">
+            <a:avLst/>
+          </a:prstGeom>
+        </p:spPr>
+      </p:pic>
+    </p:spTree>
+    <p:extLst>
+      <p:ext uri="{BB962C8B-B14F-4D97-AF65-F5344CB8AC3E}">
+        <p14:creationId xmlns:p14="http://schemas.microsoft.com/office/powerpoint/2010/main" val="1703698104"/>
+      </p:ext>
+    </p:extLst>
+  </p:cSld>
+  <p:clrMapOvr>
+    <a:masterClrMapping/>
+  </p:clrMapOvr>
+</p:sld>
+</file>
+
+<file path=ppt/slides/slide7.xml><?xml version="1.0" encoding="utf-8"?>
+<p:sld xmlns:a="http://schemas.openxmlformats.org/drawingml/2006/main" xmlns:r="http://schemas.openxmlformats.org/officeDocument/2006/relationships" xmlns:p="http://schemas.openxmlformats.org/presentationml/2006/main">
+  <p:cSld>
+    <p:spTree>
+      <p:nvGrpSpPr>
+        <p:cNvPr id="1" name=""/>
+        <p:cNvGrpSpPr/>
+        <p:nvPr/>
+      </p:nvGrpSpPr>
+      <p:grpSpPr>
+        <a:xfrm>
+          <a:off x="0" y="0"/>
+          <a:ext cx="0" cy="0"/>
+          <a:chOff x="0" y="0"/>
+          <a:chExt cx="0" cy="0"/>
+        </a:xfrm>
+      </p:grpSpPr>
+      <p:pic>
+        <p:nvPicPr>
+          <p:cNvPr id="3" name="Picture 2">
+            <a:extLst>
+              <a:ext uri="{FF2B5EF4-FFF2-40B4-BE49-F238E27FC236}">
+                <a16:creationId xmlns:a16="http://schemas.microsoft.com/office/drawing/2014/main" id="{0EA489D0-C0E1-406E-A716-AB9C07BBA28A}"/>
+              </a:ext>
+            </a:extLst>
+          </p:cNvPr>
+          <p:cNvPicPr>
+            <a:picLocks noChangeAspect="1"/>
+          </p:cNvPicPr>
+          <p:nvPr/>
+        </p:nvPicPr>
+        <p:blipFill>
+          <a:blip r:embed="rId2"/>
+          <a:stretch>
+            <a:fillRect/>
+          </a:stretch>
+        </p:blipFill>
+        <p:spPr>
+          <a:xfrm>
+            <a:off x="0" y="0"/>
+            <a:ext cx="12192000" cy="6858000"/>
+          </a:xfrm>
+          <a:prstGeom prst="rect">
+            <a:avLst/>
+          </a:prstGeom>
+        </p:spPr>
+      </p:pic>
+    </p:spTree>
+    <p:extLst>
+      <p:ext uri="{BB962C8B-B14F-4D97-AF65-F5344CB8AC3E}">
+        <p14:creationId xmlns:p14="http://schemas.microsoft.com/office/powerpoint/2010/main" val="79582433"/>
+      </p:ext>
+    </p:extLst>
+  </p:cSld>
+  <p:clrMapOvr>
+    <a:masterClrMapping/>
+  </p:clrMapOvr>
+</p:sld>
+</file>
+
+<file path=ppt/slides/slide8.xml><?xml version="1.0" encoding="utf-8"?>
+<p:sld xmlns:a="http://schemas.openxmlformats.org/drawingml/2006/main" xmlns:r="http://schemas.openxmlformats.org/officeDocument/2006/relationships" xmlns:p="http://schemas.openxmlformats.org/presentationml/2006/main">
+  <p:cSld>
+    <p:spTree>
+      <p:nvGrpSpPr>
+        <p:cNvPr id="1" name=""/>
+        <p:cNvGrpSpPr/>
+        <p:nvPr/>
+      </p:nvGrpSpPr>
+      <p:grpSpPr>
+        <a:xfrm>
+          <a:off x="0" y="0"/>
+          <a:ext cx="0" cy="0"/>
+          <a:chOff x="0" y="0"/>
+          <a:chExt cx="0" cy="0"/>
+        </a:xfrm>
+      </p:grpSpPr>
+      <p:pic>
+        <p:nvPicPr>
+          <p:cNvPr id="5" name="Picture 4">
+            <a:extLst>
+              <a:ext uri="{FF2B5EF4-FFF2-40B4-BE49-F238E27FC236}">
+                <a16:creationId xmlns:a16="http://schemas.microsoft.com/office/drawing/2014/main" id="{942A42F1-7F47-4B3A-8F5E-E1C7CCFEF401}"/>
+              </a:ext>
+            </a:extLst>
+          </p:cNvPr>
+          <p:cNvPicPr>
+            <a:picLocks noChangeAspect="1"/>
+          </p:cNvPicPr>
+          <p:nvPr/>
+        </p:nvPicPr>
+        <p:blipFill>
+          <a:blip r:embed="rId2"/>
+          <a:stretch>
+            <a:fillRect/>
+          </a:stretch>
+        </p:blipFill>
+        <p:spPr>
+          <a:xfrm>
+            <a:off x="0" y="790273"/>
+            <a:ext cx="12192000" cy="5277454"/>
+          </a:xfrm>
+          <a:prstGeom prst="rect">
+            <a:avLst/>
+          </a:prstGeom>
+        </p:spPr>
+      </p:pic>
+    </p:spTree>
+    <p:extLst>
+      <p:ext uri="{BB962C8B-B14F-4D97-AF65-F5344CB8AC3E}">
+        <p14:creationId xmlns:p14="http://schemas.microsoft.com/office/powerpoint/2010/main" val="1849774349"/>
+      </p:ext>
+    </p:extLst>
+  </p:cSld>
+  <p:clrMapOvr>
+    <a:masterClrMapping/>
+  </p:clrMapOvr>
+</p:sld>
+</file>
+
+<file path=ppt/slides/slide9.xml><?xml version="1.0" encoding="utf-8"?>
+<p:sld xmlns:a="http://schemas.openxmlformats.org/drawingml/2006/main" xmlns:r="http://schemas.openxmlformats.org/officeDocument/2006/relationships" xmlns:p="http://schemas.openxmlformats.org/presentationml/2006/main">
+  <p:cSld>
+    <p:spTree>
+      <p:nvGrpSpPr>
+        <p:cNvPr id="1" name=""/>
+        <p:cNvGrpSpPr/>
+        <p:nvPr/>
+      </p:nvGrpSpPr>
+      <p:grpSpPr>
+        <a:xfrm>
+          <a:off x="0" y="0"/>
+          <a:ext cx="0" cy="0"/>
+          <a:chOff x="0" y="0"/>
+          <a:chExt cx="0" cy="0"/>
+        </a:xfrm>
+      </p:grpSpPr>
+      <p:pic>
+        <p:nvPicPr>
+          <p:cNvPr id="5" name="Picture 4">
+            <a:extLst>
+              <a:ext uri="{FF2B5EF4-FFF2-40B4-BE49-F238E27FC236}">
+                <a16:creationId xmlns:a16="http://schemas.microsoft.com/office/drawing/2014/main" id="{72242BE4-B284-45F1-BEFA-06C3CA04BB7E}"/>
+              </a:ext>
+            </a:extLst>
+          </p:cNvPr>
+          <p:cNvPicPr>
+            <a:picLocks noChangeAspect="1"/>
+          </p:cNvPicPr>
+          <p:nvPr/>
+        </p:nvPicPr>
+        <p:blipFill>
+          <a:blip r:embed="rId2"/>
+          <a:stretch>
+            <a:fillRect/>
+          </a:stretch>
+        </p:blipFill>
+        <p:spPr>
+          <a:xfrm>
+            <a:off x="0" y="0"/>
+            <a:ext cx="12192000" cy="6858000"/>
+          </a:xfrm>
+          <a:prstGeom prst="rect">
+            <a:avLst/>
+          </a:prstGeom>
+        </p:spPr>
+      </p:pic>
+    </p:spTree>
+    <p:extLst>
+      <p:ext uri="{BB962C8B-B14F-4D97-AF65-F5344CB8AC3E}">
+        <p14:creationId xmlns:p14="http://schemas.microsoft.com/office/powerpoint/2010/main" val="2619721676"/>
       </p:ext>
     </p:extLst>
   </p:cSld>

</xml_diff>